<commit_message>
reworked the framework a bit
</commit_message>
<xml_diff>
--- a/figures/LEO+POET.pptx
+++ b/figures/LEO+POET.pptx
@@ -293,7 +293,7 @@
           <a:p>
             <a:fld id="{E4316232-3CE1-4F6D-9EC9-586EB4A4174B}" type="datetimeFigureOut">
               <a:rPr lang="en-US" smtClean="0"/>
-              <a:t>7/29/2016</a:t>
+              <a:t>8/2/2016</a:t>
             </a:fld>
             <a:endParaRPr lang="en-US"/>
           </a:p>
@@ -463,7 +463,7 @@
           <a:p>
             <a:fld id="{E4316232-3CE1-4F6D-9EC9-586EB4A4174B}" type="datetimeFigureOut">
               <a:rPr lang="en-US" smtClean="0"/>
-              <a:t>7/29/2016</a:t>
+              <a:t>8/2/2016</a:t>
             </a:fld>
             <a:endParaRPr lang="en-US"/>
           </a:p>
@@ -643,7 +643,7 @@
           <a:p>
             <a:fld id="{E4316232-3CE1-4F6D-9EC9-586EB4A4174B}" type="datetimeFigureOut">
               <a:rPr lang="en-US" smtClean="0"/>
-              <a:t>7/29/2016</a:t>
+              <a:t>8/2/2016</a:t>
             </a:fld>
             <a:endParaRPr lang="en-US"/>
           </a:p>
@@ -813,7 +813,7 @@
           <a:p>
             <a:fld id="{E4316232-3CE1-4F6D-9EC9-586EB4A4174B}" type="datetimeFigureOut">
               <a:rPr lang="en-US" smtClean="0"/>
-              <a:t>7/29/2016</a:t>
+              <a:t>8/2/2016</a:t>
             </a:fld>
             <a:endParaRPr lang="en-US"/>
           </a:p>
@@ -1059,7 +1059,7 @@
           <a:p>
             <a:fld id="{E4316232-3CE1-4F6D-9EC9-586EB4A4174B}" type="datetimeFigureOut">
               <a:rPr lang="en-US" smtClean="0"/>
-              <a:t>7/29/2016</a:t>
+              <a:t>8/2/2016</a:t>
             </a:fld>
             <a:endParaRPr lang="en-US"/>
           </a:p>
@@ -1347,7 +1347,7 @@
           <a:p>
             <a:fld id="{E4316232-3CE1-4F6D-9EC9-586EB4A4174B}" type="datetimeFigureOut">
               <a:rPr lang="en-US" smtClean="0"/>
-              <a:t>7/29/2016</a:t>
+              <a:t>8/2/2016</a:t>
             </a:fld>
             <a:endParaRPr lang="en-US"/>
           </a:p>
@@ -1769,7 +1769,7 @@
           <a:p>
             <a:fld id="{E4316232-3CE1-4F6D-9EC9-586EB4A4174B}" type="datetimeFigureOut">
               <a:rPr lang="en-US" smtClean="0"/>
-              <a:t>7/29/2016</a:t>
+              <a:t>8/2/2016</a:t>
             </a:fld>
             <a:endParaRPr lang="en-US"/>
           </a:p>
@@ -1887,7 +1887,7 @@
           <a:p>
             <a:fld id="{E4316232-3CE1-4F6D-9EC9-586EB4A4174B}" type="datetimeFigureOut">
               <a:rPr lang="en-US" smtClean="0"/>
-              <a:t>7/29/2016</a:t>
+              <a:t>8/2/2016</a:t>
             </a:fld>
             <a:endParaRPr lang="en-US"/>
           </a:p>
@@ -1982,7 +1982,7 @@
           <a:p>
             <a:fld id="{E4316232-3CE1-4F6D-9EC9-586EB4A4174B}" type="datetimeFigureOut">
               <a:rPr lang="en-US" smtClean="0"/>
-              <a:t>7/29/2016</a:t>
+              <a:t>8/2/2016</a:t>
             </a:fld>
             <a:endParaRPr lang="en-US"/>
           </a:p>
@@ -2259,7 +2259,7 @@
           <a:p>
             <a:fld id="{E4316232-3CE1-4F6D-9EC9-586EB4A4174B}" type="datetimeFigureOut">
               <a:rPr lang="en-US" smtClean="0"/>
-              <a:t>7/29/2016</a:t>
+              <a:t>8/2/2016</a:t>
             </a:fld>
             <a:endParaRPr lang="en-US"/>
           </a:p>
@@ -2512,7 +2512,7 @@
           <a:p>
             <a:fld id="{E4316232-3CE1-4F6D-9EC9-586EB4A4174B}" type="datetimeFigureOut">
               <a:rPr lang="en-US" smtClean="0"/>
-              <a:t>7/29/2016</a:t>
+              <a:t>8/2/2016</a:t>
             </a:fld>
             <a:endParaRPr lang="en-US"/>
           </a:p>
@@ -2725,7 +2725,7 @@
           <a:p>
             <a:fld id="{E4316232-3CE1-4F6D-9EC9-586EB4A4174B}" type="datetimeFigureOut">
               <a:rPr lang="en-US" smtClean="0"/>
-              <a:t>7/29/2016</a:t>
+              <a:t>8/2/2016</a:t>
             </a:fld>
             <a:endParaRPr lang="en-US"/>
           </a:p>
@@ -5076,11 +5076,6 @@
                 </a:rPr>
                 <a:t>2</a:t>
               </a:r>
-              <a:endParaRPr lang="en-US" dirty="0">
-                <a:solidFill>
-                  <a:schemeClr val="bg1"/>
-                </a:solidFill>
-              </a:endParaRPr>
             </a:p>
           </p:txBody>
         </p:sp>
@@ -5722,11 +5717,6 @@
                 </a:rPr>
                 <a:t>2</a:t>
               </a:r>
-              <a:endParaRPr lang="en-US" dirty="0">
-                <a:solidFill>
-                  <a:schemeClr val="bg1"/>
-                </a:solidFill>
-              </a:endParaRPr>
             </a:p>
           </p:txBody>
         </p:sp>
@@ -6322,11 +6312,6 @@
                 </a:rPr>
                 <a:t>2</a:t>
               </a:r>
-              <a:endParaRPr lang="en-US" dirty="0">
-                <a:solidFill>
-                  <a:schemeClr val="bg1"/>
-                </a:solidFill>
-              </a:endParaRPr>
             </a:p>
           </p:txBody>
         </p:sp>
@@ -12648,8 +12633,8 @@
         </p:nvGrpSpPr>
         <p:grpSpPr>
           <a:xfrm>
-            <a:off x="1600200" y="1664968"/>
-            <a:ext cx="2438400" cy="2678432"/>
+            <a:off x="304800" y="304800"/>
+            <a:ext cx="3352800" cy="2907032"/>
             <a:chOff x="2667000" y="3083169"/>
             <a:chExt cx="3505200" cy="3767628"/>
           </a:xfrm>
@@ -13239,11 +13224,6 @@
                 </a:rPr>
                 <a:t>2</a:t>
               </a:r>
-              <a:endParaRPr lang="en-US" sz="1200" dirty="0">
-                <a:solidFill>
-                  <a:schemeClr val="bg1"/>
-                </a:solidFill>
-              </a:endParaRPr>
             </a:p>
           </p:txBody>
         </p:sp>
@@ -13462,19 +13442,238 @@
           </p:txBody>
         </p:sp>
       </p:grpSp>
+      <p:grpSp>
+        <p:nvGrpSpPr>
+          <p:cNvPr id="91" name="Group 90"/>
+          <p:cNvGrpSpPr/>
+          <p:nvPr/>
+        </p:nvGrpSpPr>
+        <p:grpSpPr>
+          <a:xfrm>
+            <a:off x="4267200" y="3364702"/>
+            <a:ext cx="1619250" cy="978698"/>
+            <a:chOff x="4229100" y="2627105"/>
+            <a:chExt cx="1619250" cy="978698"/>
+          </a:xfrm>
+        </p:grpSpPr>
+        <p:sp>
+          <p:nvSpPr>
+            <p:cNvPr id="61" name="Rectangle 60"/>
+            <p:cNvSpPr/>
+            <p:nvPr/>
+          </p:nvSpPr>
+          <p:spPr>
+            <a:xfrm>
+              <a:off x="4229100" y="2627105"/>
+              <a:ext cx="1485900" cy="978698"/>
+            </a:xfrm>
+            <a:prstGeom prst="rect">
+              <a:avLst/>
+            </a:prstGeom>
+          </p:spPr>
+          <p:style>
+            <a:lnRef idx="1">
+              <a:schemeClr val="accent1"/>
+            </a:lnRef>
+            <a:fillRef idx="2">
+              <a:schemeClr val="accent1"/>
+            </a:fillRef>
+            <a:effectRef idx="1">
+              <a:schemeClr val="accent1"/>
+            </a:effectRef>
+            <a:fontRef idx="minor">
+              <a:schemeClr val="dk1"/>
+            </a:fontRef>
+          </p:style>
+          <p:txBody>
+            <a:bodyPr rtlCol="0" anchor="ctr"/>
+            <a:lstStyle/>
+            <a:p>
+              <a:pPr algn="ctr"/>
+              <a:endParaRPr lang="en-US"/>
+            </a:p>
+          </p:txBody>
+        </p:sp>
+        <p:sp>
+          <p:nvSpPr>
+            <p:cNvPr id="93" name="Rectangle 92"/>
+            <p:cNvSpPr/>
+            <p:nvPr/>
+          </p:nvSpPr>
+          <p:spPr>
+            <a:xfrm>
+              <a:off x="4610100" y="2627105"/>
+              <a:ext cx="1238250" cy="978698"/>
+            </a:xfrm>
+            <a:prstGeom prst="rect">
+              <a:avLst/>
+            </a:prstGeom>
+          </p:spPr>
+          <p:style>
+            <a:lnRef idx="1">
+              <a:schemeClr val="accent1"/>
+            </a:lnRef>
+            <a:fillRef idx="2">
+              <a:schemeClr val="accent1"/>
+            </a:fillRef>
+            <a:effectRef idx="1">
+              <a:schemeClr val="accent1"/>
+            </a:effectRef>
+            <a:fontRef idx="minor">
+              <a:schemeClr val="dk1"/>
+            </a:fontRef>
+          </p:style>
+          <p:txBody>
+            <a:bodyPr rtlCol="0" anchor="ctr"/>
+            <a:lstStyle/>
+            <a:p>
+              <a:pPr algn="ctr"/>
+              <a:endParaRPr lang="en-US"/>
+            </a:p>
+          </p:txBody>
+        </p:sp>
+        <p:sp>
+          <p:nvSpPr>
+            <p:cNvPr id="95" name="TextBox 94"/>
+            <p:cNvSpPr txBox="1"/>
+            <p:nvPr/>
+          </p:nvSpPr>
+          <p:spPr>
+            <a:xfrm>
+              <a:off x="4229100" y="2658070"/>
+              <a:ext cx="1619250" cy="923330"/>
+            </a:xfrm>
+            <a:prstGeom prst="rect">
+              <a:avLst/>
+            </a:prstGeom>
+            <a:noFill/>
+          </p:spPr>
+          <p:txBody>
+            <a:bodyPr wrap="square" rtlCol="0">
+              <a:spAutoFit/>
+            </a:bodyPr>
+            <a:lstStyle/>
+            <a:p>
+              <a:pPr algn="ctr"/>
+              <a:r>
+                <a:rPr lang="en-US" dirty="0" smtClean="0"/>
+                <a:t>Performance </a:t>
+              </a:r>
+            </a:p>
+            <a:p>
+              <a:pPr algn="ctr"/>
+              <a:r>
+                <a:rPr lang="en-US" dirty="0" smtClean="0"/>
+                <a:t>Hash</a:t>
+              </a:r>
+            </a:p>
+            <a:p>
+              <a:pPr algn="ctr"/>
+              <a:r>
+                <a:rPr lang="en-US" dirty="0" smtClean="0"/>
+                <a:t>Table</a:t>
+              </a:r>
+              <a:endParaRPr lang="en-US" dirty="0" smtClean="0"/>
+            </a:p>
+          </p:txBody>
+        </p:sp>
+      </p:grpSp>
       <p:cxnSp>
         <p:nvCxnSpPr>
-          <p:cNvPr id="94" name="Elbow Connector 93"/>
+          <p:cNvPr id="64" name="Straight Arrow Connector 63"/>
           <p:cNvCxnSpPr>
-            <a:stCxn id="75" idx="6"/>
+            <a:stCxn id="95" idx="2"/>
             <a:endCxn id="63" idx="0"/>
           </p:cNvCxnSpPr>
           <p:nvPr/>
         </p:nvCxnSpPr>
         <p:spPr>
           <a:xfrm>
-            <a:off x="3985591" y="2994244"/>
-            <a:ext cx="1119809" cy="1730156"/>
+            <a:off x="5076825" y="4318997"/>
+            <a:ext cx="28575" cy="405403"/>
+          </a:xfrm>
+          <a:prstGeom prst="straightConnector1">
+            <a:avLst/>
+          </a:prstGeom>
+          <a:ln>
+            <a:tailEnd type="arrow"/>
+          </a:ln>
+        </p:spPr>
+        <p:style>
+          <a:lnRef idx="3">
+            <a:schemeClr val="accent1"/>
+          </a:lnRef>
+          <a:fillRef idx="0">
+            <a:schemeClr val="accent1"/>
+          </a:fillRef>
+          <a:effectRef idx="2">
+            <a:schemeClr val="accent1"/>
+          </a:effectRef>
+          <a:fontRef idx="minor">
+            <a:schemeClr val="tx1"/>
+          </a:fontRef>
+        </p:style>
+      </p:cxnSp>
+      <p:sp>
+        <p:nvSpPr>
+          <p:cNvPr id="107" name="Rectangle 106"/>
+          <p:cNvSpPr/>
+          <p:nvPr/>
+        </p:nvSpPr>
+        <p:spPr>
+          <a:xfrm>
+            <a:off x="228600" y="228600"/>
+            <a:ext cx="3505200" cy="3124200"/>
+          </a:xfrm>
+          <a:prstGeom prst="rect">
+            <a:avLst/>
+          </a:prstGeom>
+          <a:noFill/>
+          <a:ln w="38100">
+            <a:solidFill>
+              <a:schemeClr val="tx1"/>
+            </a:solidFill>
+            <a:prstDash val="dash"/>
+          </a:ln>
+        </p:spPr>
+        <p:style>
+          <a:lnRef idx="2">
+            <a:schemeClr val="accent1">
+              <a:shade val="50000"/>
+            </a:schemeClr>
+          </a:lnRef>
+          <a:fillRef idx="1">
+            <a:schemeClr val="accent1"/>
+          </a:fillRef>
+          <a:effectRef idx="0">
+            <a:schemeClr val="accent1"/>
+          </a:effectRef>
+          <a:fontRef idx="minor">
+            <a:schemeClr val="lt1"/>
+          </a:fontRef>
+        </p:style>
+        <p:txBody>
+          <a:bodyPr rtlCol="0" anchor="ctr"/>
+          <a:lstStyle/>
+          <a:p>
+            <a:pPr algn="ctr"/>
+            <a:endParaRPr lang="en-US"/>
+          </a:p>
+        </p:txBody>
+      </p:sp>
+      <p:cxnSp>
+        <p:nvCxnSpPr>
+          <p:cNvPr id="111" name="Elbow Connector 110"/>
+          <p:cNvCxnSpPr>
+            <a:stCxn id="48" idx="0"/>
+            <a:endCxn id="86" idx="3"/>
+          </p:cNvCxnSpPr>
+          <p:nvPr/>
+        </p:nvCxnSpPr>
+        <p:spPr>
+          <a:xfrm rot="16200000" flipV="1">
+            <a:off x="5510642" y="1006032"/>
+            <a:ext cx="112727" cy="3818810"/>
           </a:xfrm>
           <a:prstGeom prst="bentConnector2">
             <a:avLst/>
@@ -13500,14 +13699,49 @@
       </p:cxnSp>
       <p:cxnSp>
         <p:nvCxnSpPr>
-          <p:cNvPr id="102" name="Straight Connector 101"/>
+          <p:cNvPr id="114" name="Elbow Connector 113"/>
+          <p:cNvCxnSpPr>
+            <a:stCxn id="75" idx="6"/>
+          </p:cNvCxnSpPr>
+          <p:nvPr/>
+        </p:nvCxnSpPr>
+        <p:spPr>
+          <a:xfrm>
+            <a:off x="3584713" y="1747527"/>
+            <a:ext cx="1520687" cy="1617175"/>
+          </a:xfrm>
+          <a:prstGeom prst="bentConnector2">
+            <a:avLst/>
+          </a:prstGeom>
+          <a:ln>
+            <a:tailEnd type="arrow"/>
+          </a:ln>
+        </p:spPr>
+        <p:style>
+          <a:lnRef idx="3">
+            <a:schemeClr val="accent1"/>
+          </a:lnRef>
+          <a:fillRef idx="0">
+            <a:schemeClr val="accent1"/>
+          </a:fillRef>
+          <a:effectRef idx="2">
+            <a:schemeClr val="accent1"/>
+          </a:effectRef>
+          <a:fontRef idx="minor">
+            <a:schemeClr val="tx1"/>
+          </a:fontRef>
+        </p:style>
+      </p:cxnSp>
+      <p:cxnSp>
+        <p:nvCxnSpPr>
+          <p:cNvPr id="117" name="Straight Connector 116"/>
           <p:cNvCxnSpPr/>
           <p:nvPr/>
         </p:nvCxnSpPr>
         <p:spPr>
           <a:xfrm>
-            <a:off x="1066800" y="4494250"/>
-            <a:ext cx="3162300" cy="0"/>
+            <a:off x="4038600" y="2506298"/>
+            <a:ext cx="0" cy="1303702"/>
           </a:xfrm>
           <a:prstGeom prst="line">
             <a:avLst/>
@@ -13533,14 +13767,14 @@
       </p:cxnSp>
       <p:cxnSp>
         <p:nvCxnSpPr>
-          <p:cNvPr id="103" name="Straight Connector 102"/>
+          <p:cNvPr id="118" name="Straight Connector 117"/>
           <p:cNvCxnSpPr/>
           <p:nvPr/>
         </p:nvCxnSpPr>
         <p:spPr>
           <a:xfrm flipV="1">
-            <a:off x="1066800" y="1524000"/>
-            <a:ext cx="0" cy="2977316"/>
+            <a:off x="4038600" y="2506298"/>
+            <a:ext cx="4953000" cy="5558"/>
           </a:xfrm>
           <a:prstGeom prst="line">
             <a:avLst/>
@@ -13566,14 +13800,14 @@
       </p:cxnSp>
       <p:cxnSp>
         <p:nvCxnSpPr>
-          <p:cNvPr id="106" name="Straight Connector 105"/>
+          <p:cNvPr id="121" name="Straight Connector 120"/>
           <p:cNvCxnSpPr/>
           <p:nvPr/>
         </p:nvCxnSpPr>
         <p:spPr>
-          <a:xfrm>
-            <a:off x="1104900" y="1524000"/>
-            <a:ext cx="4895850" cy="0"/>
+          <a:xfrm flipV="1">
+            <a:off x="8991600" y="2511856"/>
+            <a:ext cx="0" cy="3965144"/>
           </a:xfrm>
           <a:prstGeom prst="line">
             <a:avLst/>
@@ -13599,14 +13833,14 @@
       </p:cxnSp>
       <p:cxnSp>
         <p:nvCxnSpPr>
-          <p:cNvPr id="108" name="Straight Connector 107"/>
+          <p:cNvPr id="124" name="Straight Connector 123"/>
           <p:cNvCxnSpPr/>
           <p:nvPr/>
         </p:nvCxnSpPr>
         <p:spPr>
-          <a:xfrm flipH="1" flipV="1">
-            <a:off x="5981700" y="1524000"/>
-            <a:ext cx="465" cy="4204915"/>
+          <a:xfrm flipH="1">
+            <a:off x="0" y="6477000"/>
+            <a:ext cx="8991600" cy="0"/>
           </a:xfrm>
           <a:prstGeom prst="line">
             <a:avLst/>
@@ -13632,14 +13866,14 @@
       </p:cxnSp>
       <p:cxnSp>
         <p:nvCxnSpPr>
-          <p:cNvPr id="110" name="Straight Connector 109"/>
+          <p:cNvPr id="127" name="Straight Connector 126"/>
           <p:cNvCxnSpPr/>
           <p:nvPr/>
         </p:nvCxnSpPr>
         <p:spPr>
-          <a:xfrm>
-            <a:off x="4229100" y="5791200"/>
-            <a:ext cx="1752600" cy="0"/>
+          <a:xfrm flipH="1">
+            <a:off x="0" y="3810000"/>
+            <a:ext cx="4038600" cy="0"/>
           </a:xfrm>
           <a:prstGeom prst="line">
             <a:avLst/>
@@ -13665,14 +13899,14 @@
       </p:cxnSp>
       <p:cxnSp>
         <p:nvCxnSpPr>
-          <p:cNvPr id="112" name="Straight Connector 111"/>
+          <p:cNvPr id="130" name="Straight Connector 129"/>
           <p:cNvCxnSpPr/>
           <p:nvPr/>
         </p:nvCxnSpPr>
         <p:spPr>
           <a:xfrm flipV="1">
-            <a:off x="4229100" y="4481886"/>
-            <a:ext cx="0" cy="1309314"/>
+            <a:off x="0" y="3810000"/>
+            <a:ext cx="0" cy="2667000"/>
           </a:xfrm>
           <a:prstGeom prst="line">
             <a:avLst/>
@@ -13696,6 +13930,85 @@
           </a:fontRef>
         </p:style>
       </p:cxnSp>
+      <p:sp>
+        <p:nvSpPr>
+          <p:cNvPr id="135" name="TextBox 134"/>
+          <p:cNvSpPr txBox="1"/>
+          <p:nvPr/>
+        </p:nvSpPr>
+        <p:spPr>
+          <a:xfrm>
+            <a:off x="2286000" y="258337"/>
+            <a:ext cx="1462851" cy="923330"/>
+          </a:xfrm>
+          <a:prstGeom prst="rect">
+            <a:avLst/>
+          </a:prstGeom>
+          <a:noFill/>
+        </p:spPr>
+        <p:txBody>
+          <a:bodyPr wrap="square" rtlCol="0">
+            <a:spAutoFit/>
+          </a:bodyPr>
+          <a:lstStyle/>
+          <a:p>
+            <a:pPr algn="ctr"/>
+            <a:r>
+              <a:rPr lang="en-US" dirty="0" smtClean="0"/>
+              <a:t>Server, </a:t>
+            </a:r>
+          </a:p>
+          <a:p>
+            <a:pPr algn="ctr"/>
+            <a:r>
+              <a:rPr lang="en-US" dirty="0" smtClean="0"/>
+              <a:t>Running HBM</a:t>
+            </a:r>
+          </a:p>
+        </p:txBody>
+      </p:sp>
+      <p:sp>
+        <p:nvSpPr>
+          <p:cNvPr id="136" name="TextBox 135"/>
+          <p:cNvSpPr txBox="1"/>
+          <p:nvPr/>
+        </p:nvSpPr>
+        <p:spPr>
+          <a:xfrm>
+            <a:off x="61149" y="3886200"/>
+            <a:ext cx="3977451" cy="646331"/>
+          </a:xfrm>
+          <a:prstGeom prst="rect">
+            <a:avLst/>
+          </a:prstGeom>
+          <a:noFill/>
+        </p:spPr>
+        <p:txBody>
+          <a:bodyPr wrap="square" rtlCol="0">
+            <a:spAutoFit/>
+          </a:bodyPr>
+          <a:lstStyle/>
+          <a:p>
+            <a:pPr algn="ctr"/>
+            <a:r>
+              <a:rPr lang="en-US" dirty="0" smtClean="0"/>
+              <a:t>Mobile Device, </a:t>
+            </a:r>
+          </a:p>
+          <a:p>
+            <a:pPr algn="ctr"/>
+            <a:r>
+              <a:rPr lang="en-US" dirty="0" smtClean="0"/>
+              <a:t>Running Lightweight </a:t>
+            </a:r>
+            <a:r>
+              <a:rPr lang="en-US" smtClean="0"/>
+              <a:t>Control System</a:t>
+            </a:r>
+            <a:endParaRPr lang="en-US" dirty="0" smtClean="0"/>
+          </a:p>
+        </p:txBody>
+      </p:sp>
     </p:spTree>
     <p:extLst>
       <p:ext uri="{BB962C8B-B14F-4D97-AF65-F5344CB8AC3E}">

</xml_diff>

<commit_message>
added bettter explanantion of PHT to section 3
</commit_message>
<xml_diff>
--- a/figures/LEO+POET.pptx
+++ b/figures/LEO+POET.pptx
@@ -109,6 +109,22 @@
       </a:defRPr>
     </a:lvl9pPr>
   </p:defaultTextStyle>
+  <p:extLst>
+    <p:ext uri="{EFAFB233-063F-42B5-8137-9DF3F51BA10A}">
+      <p15:sldGuideLst xmlns:p15="http://schemas.microsoft.com/office/powerpoint/2012/main">
+        <p15:guide id="1" orient="horz" pos="2160">
+          <p15:clr>
+            <a:srgbClr val="A4A3A4"/>
+          </p15:clr>
+        </p15:guide>
+        <p15:guide id="2" pos="2880">
+          <p15:clr>
+            <a:srgbClr val="A4A3A4"/>
+          </p15:clr>
+        </p15:guide>
+      </p15:sldGuideLst>
+    </p:ext>
+  </p:extLst>
 </p:presentation>
 </file>
 
@@ -293,7 +309,7 @@
           <a:p>
             <a:fld id="{E4316232-3CE1-4F6D-9EC9-586EB4A4174B}" type="datetimeFigureOut">
               <a:rPr lang="en-US" smtClean="0"/>
-              <a:t>8/2/2016</a:t>
+              <a:t>8/9/2016</a:t>
             </a:fld>
             <a:endParaRPr lang="en-US"/>
           </a:p>
@@ -463,7 +479,7 @@
           <a:p>
             <a:fld id="{E4316232-3CE1-4F6D-9EC9-586EB4A4174B}" type="datetimeFigureOut">
               <a:rPr lang="en-US" smtClean="0"/>
-              <a:t>8/2/2016</a:t>
+              <a:t>8/9/2016</a:t>
             </a:fld>
             <a:endParaRPr lang="en-US"/>
           </a:p>
@@ -643,7 +659,7 @@
           <a:p>
             <a:fld id="{E4316232-3CE1-4F6D-9EC9-586EB4A4174B}" type="datetimeFigureOut">
               <a:rPr lang="en-US" smtClean="0"/>
-              <a:t>8/2/2016</a:t>
+              <a:t>8/9/2016</a:t>
             </a:fld>
             <a:endParaRPr lang="en-US"/>
           </a:p>
@@ -813,7 +829,7 @@
           <a:p>
             <a:fld id="{E4316232-3CE1-4F6D-9EC9-586EB4A4174B}" type="datetimeFigureOut">
               <a:rPr lang="en-US" smtClean="0"/>
-              <a:t>8/2/2016</a:t>
+              <a:t>8/9/2016</a:t>
             </a:fld>
             <a:endParaRPr lang="en-US"/>
           </a:p>
@@ -1059,7 +1075,7 @@
           <a:p>
             <a:fld id="{E4316232-3CE1-4F6D-9EC9-586EB4A4174B}" type="datetimeFigureOut">
               <a:rPr lang="en-US" smtClean="0"/>
-              <a:t>8/2/2016</a:t>
+              <a:t>8/9/2016</a:t>
             </a:fld>
             <a:endParaRPr lang="en-US"/>
           </a:p>
@@ -1347,7 +1363,7 @@
           <a:p>
             <a:fld id="{E4316232-3CE1-4F6D-9EC9-586EB4A4174B}" type="datetimeFigureOut">
               <a:rPr lang="en-US" smtClean="0"/>
-              <a:t>8/2/2016</a:t>
+              <a:t>8/9/2016</a:t>
             </a:fld>
             <a:endParaRPr lang="en-US"/>
           </a:p>
@@ -1769,7 +1785,7 @@
           <a:p>
             <a:fld id="{E4316232-3CE1-4F6D-9EC9-586EB4A4174B}" type="datetimeFigureOut">
               <a:rPr lang="en-US" smtClean="0"/>
-              <a:t>8/2/2016</a:t>
+              <a:t>8/9/2016</a:t>
             </a:fld>
             <a:endParaRPr lang="en-US"/>
           </a:p>
@@ -1887,7 +1903,7 @@
           <a:p>
             <a:fld id="{E4316232-3CE1-4F6D-9EC9-586EB4A4174B}" type="datetimeFigureOut">
               <a:rPr lang="en-US" smtClean="0"/>
-              <a:t>8/2/2016</a:t>
+              <a:t>8/9/2016</a:t>
             </a:fld>
             <a:endParaRPr lang="en-US"/>
           </a:p>
@@ -1982,7 +1998,7 @@
           <a:p>
             <a:fld id="{E4316232-3CE1-4F6D-9EC9-586EB4A4174B}" type="datetimeFigureOut">
               <a:rPr lang="en-US" smtClean="0"/>
-              <a:t>8/2/2016</a:t>
+              <a:t>8/9/2016</a:t>
             </a:fld>
             <a:endParaRPr lang="en-US"/>
           </a:p>
@@ -2259,7 +2275,7 @@
           <a:p>
             <a:fld id="{E4316232-3CE1-4F6D-9EC9-586EB4A4174B}" type="datetimeFigureOut">
               <a:rPr lang="en-US" smtClean="0"/>
-              <a:t>8/2/2016</a:t>
+              <a:t>8/9/2016</a:t>
             </a:fld>
             <a:endParaRPr lang="en-US"/>
           </a:p>
@@ -2512,7 +2528,7 @@
           <a:p>
             <a:fld id="{E4316232-3CE1-4F6D-9EC9-586EB4A4174B}" type="datetimeFigureOut">
               <a:rPr lang="en-US" smtClean="0"/>
-              <a:t>8/2/2016</a:t>
+              <a:t>8/9/2016</a:t>
             </a:fld>
             <a:endParaRPr lang="en-US"/>
           </a:p>
@@ -2725,7 +2741,7 @@
           <a:p>
             <a:fld id="{E4316232-3CE1-4F6D-9EC9-586EB4A4174B}" type="datetimeFigureOut">
               <a:rPr lang="en-US" smtClean="0"/>
-              <a:t>8/2/2016</a:t>
+              <a:t>8/9/2016</a:t>
             </a:fld>
             <a:endParaRPr lang="en-US"/>
           </a:p>
@@ -4422,8 +4438,8 @@
           </p:nvSpPr>
           <p:spPr>
             <a:xfrm>
-              <a:off x="4572000" y="2477869"/>
-              <a:ext cx="990600" cy="646331"/>
+              <a:off x="4495800" y="2667000"/>
+              <a:ext cx="1143000" cy="369332"/>
             </a:xfrm>
             <a:prstGeom prst="rect">
               <a:avLst/>
@@ -4439,16 +4455,9 @@
               <a:pPr algn="ctr"/>
               <a:r>
                 <a:rPr lang="en-US" dirty="0" smtClean="0"/>
-                <a:t>This</a:t>
+                <a:t>CALOREE</a:t>
               </a:r>
-            </a:p>
-            <a:p>
-              <a:pPr algn="ctr"/>
-              <a:r>
-                <a:rPr lang="en-US" dirty="0" smtClean="0"/>
-                <a:t>Paper</a:t>
-              </a:r>
-              <a:endParaRPr lang="en-US" dirty="0"/>
+              <a:endParaRPr lang="en-US" dirty="0" smtClean="0"/>
             </a:p>
           </p:txBody>
         </p:sp>
@@ -13573,7 +13582,6 @@
                 <a:rPr lang="en-US" dirty="0" smtClean="0"/>
                 <a:t>Table</a:t>
               </a:r>
-              <a:endParaRPr lang="en-US" dirty="0" smtClean="0"/>
             </a:p>
           </p:txBody>
         </p:sp>

</xml_diff>

<commit_message>
this is going to hurt
</commit_message>
<xml_diff>
--- a/figures/LEO+POET.pptx
+++ b/figures/LEO+POET.pptx
@@ -10,7 +10,8 @@
     <p:sldId id="257" r:id="rId4"/>
     <p:sldId id="259" r:id="rId5"/>
     <p:sldId id="260" r:id="rId6"/>
-    <p:sldId id="261" r:id="rId7"/>
+    <p:sldId id="262" r:id="rId7"/>
+    <p:sldId id="261" r:id="rId8"/>
   </p:sldIdLst>
   <p:sldSz cx="9144000" cy="6858000" type="screen4x3"/>
   <p:notesSz cx="6858000" cy="9144000"/>
@@ -126,6 +127,1512 @@
     </p:ext>
   </p:extLst>
 </p:presentation>
+</file>
+
+<file path=ppt/charts/chart1.xml><?xml version="1.0" encoding="utf-8"?>
+<c:chartSpace xmlns:c="http://schemas.openxmlformats.org/drawingml/2006/chart" xmlns:a="http://schemas.openxmlformats.org/drawingml/2006/main" xmlns:r="http://schemas.openxmlformats.org/officeDocument/2006/relationships">
+  <c:date1904 val="0"/>
+  <c:lang val="en-US"/>
+  <c:roundedCorners val="0"/>
+  <mc:AlternateContent xmlns:mc="http://schemas.openxmlformats.org/markup-compatibility/2006">
+    <mc:Choice xmlns:c14="http://schemas.microsoft.com/office/drawing/2007/8/2/chart" Requires="c14">
+      <c14:style val="103"/>
+    </mc:Choice>
+    <mc:Fallback>
+      <c:style val="3"/>
+    </mc:Fallback>
+  </mc:AlternateContent>
+  <c:chart>
+    <c:autoTitleDeleted val="1"/>
+    <c:plotArea>
+      <c:layout/>
+      <c:scatterChart>
+        <c:scatterStyle val="lineMarker"/>
+        <c:varyColors val="0"/>
+        <c:ser>
+          <c:idx val="0"/>
+          <c:order val="0"/>
+          <c:tx>
+            <c:strRef>
+              <c:f>Sheet1!$B$1</c:f>
+              <c:strCache>
+                <c:ptCount val="1"/>
+                <c:pt idx="0">
+                  <c:v>Lower Convex Hull</c:v>
+                </c:pt>
+              </c:strCache>
+            </c:strRef>
+          </c:tx>
+          <c:spPr>
+            <a:ln w="19050" cap="rnd">
+              <a:solidFill>
+                <a:schemeClr val="accent1">
+                  <a:shade val="76000"/>
+                </a:schemeClr>
+              </a:solidFill>
+              <a:round/>
+            </a:ln>
+            <a:effectLst/>
+          </c:spPr>
+          <c:marker>
+            <c:symbol val="circle"/>
+            <c:size val="5"/>
+            <c:spPr>
+              <a:solidFill>
+                <a:schemeClr val="accent1">
+                  <a:shade val="76000"/>
+                </a:schemeClr>
+              </a:solidFill>
+              <a:ln w="9525">
+                <a:solidFill>
+                  <a:schemeClr val="accent1">
+                    <a:shade val="76000"/>
+                  </a:schemeClr>
+                </a:solidFill>
+              </a:ln>
+              <a:effectLst/>
+            </c:spPr>
+          </c:marker>
+          <c:xVal>
+            <c:numRef>
+              <c:f>Sheet1!$A$2:$A$60</c:f>
+              <c:numCache>
+                <c:formatCode>General</c:formatCode>
+                <c:ptCount val="59"/>
+                <c:pt idx="0">
+                  <c:v>0</c:v>
+                </c:pt>
+                <c:pt idx="1">
+                  <c:v>0.2</c:v>
+                </c:pt>
+                <c:pt idx="2">
+                  <c:v>0.8</c:v>
+                </c:pt>
+                <c:pt idx="3">
+                  <c:v>1</c:v>
+                </c:pt>
+                <c:pt idx="4">
+                  <c:v>0.5</c:v>
+                </c:pt>
+                <c:pt idx="5">
+                  <c:v>0.6772113320915033</c:v>
+                </c:pt>
+                <c:pt idx="6">
+                  <c:v>0.67290902054268398</c:v>
+                </c:pt>
+                <c:pt idx="7">
+                  <c:v>0.2859596385123368</c:v>
+                </c:pt>
+                <c:pt idx="8">
+                  <c:v>0.71088394501022933</c:v>
+                </c:pt>
+                <c:pt idx="9">
+                  <c:v>0.67485932581006081</c:v>
+                </c:pt>
+                <c:pt idx="10">
+                  <c:v>0.40451374861621636</c:v>
+                </c:pt>
+                <c:pt idx="11">
+                  <c:v>0.38624610198779152</c:v>
+                </c:pt>
+                <c:pt idx="12">
+                  <c:v>0.43933044757381845</c:v>
+                </c:pt>
+                <c:pt idx="13">
+                  <c:v>0.4707373870292248</c:v>
+                </c:pt>
+                <c:pt idx="14">
+                  <c:v>0.43007746174589245</c:v>
+                </c:pt>
+                <c:pt idx="15">
+                  <c:v>0.45789169332304247</c:v>
+                </c:pt>
+                <c:pt idx="16">
+                  <c:v>0.72735290833425204</c:v>
+                </c:pt>
+                <c:pt idx="17">
+                  <c:v>0.51502009878188115</c:v>
+                </c:pt>
+                <c:pt idx="18">
+                  <c:v>0.71406912266140088</c:v>
+                </c:pt>
+                <c:pt idx="19">
+                  <c:v>0.41024702712527461</c:v>
+                </c:pt>
+                <c:pt idx="20">
+                  <c:v>0.23945471531027351</c:v>
+                </c:pt>
+                <c:pt idx="21">
+                  <c:v>0.7553088896456619</c:v>
+                </c:pt>
+                <c:pt idx="22">
+                  <c:v>0.44802675800176417</c:v>
+                </c:pt>
+                <c:pt idx="23">
+                  <c:v>0.74695135306483018</c:v>
+                </c:pt>
+                <c:pt idx="24">
+                  <c:v>0.32116122687684595</c:v>
+                </c:pt>
+                <c:pt idx="25">
+                  <c:v>0.79242287091948826</c:v>
+                </c:pt>
+                <c:pt idx="26">
+                  <c:v>0.24345526554224292</c:v>
+                </c:pt>
+                <c:pt idx="27">
+                  <c:v>0.30612427652449015</c:v>
+                </c:pt>
+                <c:pt idx="28">
+                  <c:v>0.55861960181599568</c:v>
+                </c:pt>
+                <c:pt idx="29">
+                  <c:v>0.30145208816403651</c:v>
+                </c:pt>
+                <c:pt idx="30">
+                  <c:v>0.37360927891333157</c:v>
+                </c:pt>
+                <c:pt idx="31">
+                  <c:v>0.65366042039419803</c:v>
+                </c:pt>
+                <c:pt idx="32">
+                  <c:v>0.38116932607607146</c:v>
+                </c:pt>
+                <c:pt idx="33">
+                  <c:v>0.57744048836671968</c:v>
+                </c:pt>
+                <c:pt idx="34">
+                  <c:v>0.11858538466911957</c:v>
+                </c:pt>
+                <c:pt idx="35">
+                  <c:v>5.9183753484281447E-2</c:v>
+                </c:pt>
+                <c:pt idx="36">
+                  <c:v>9.8108214064926383E-2</c:v>
+                </c:pt>
+                <c:pt idx="37">
+                  <c:v>0.15095121044816839</c:v>
+                </c:pt>
+                <c:pt idx="38">
+                  <c:v>0.12457402863403044</c:v>
+                </c:pt>
+                <c:pt idx="39">
+                  <c:v>4.7177229147734147E-3</c:v>
+                </c:pt>
+                <c:pt idx="40">
+                  <c:v>4.1616882744593325E-2</c:v>
+                </c:pt>
+                <c:pt idx="41">
+                  <c:v>7.0956681571415327E-3</c:v>
+                </c:pt>
+                <c:pt idx="42">
+                  <c:v>0.1506608002961381</c:v>
+                </c:pt>
+                <c:pt idx="43">
+                  <c:v>0.12003307872131708</c:v>
+                </c:pt>
+                <c:pt idx="44">
+                  <c:v>0.19700031735751505</c:v>
+                </c:pt>
+                <c:pt idx="45">
+                  <c:v>0.19150009716221419</c:v>
+                </c:pt>
+                <c:pt idx="46">
+                  <c:v>0.95926133630677146</c:v>
+                </c:pt>
+                <c:pt idx="47">
+                  <c:v>0.96502856640484436</c:v>
+                </c:pt>
+                <c:pt idx="48">
+                  <c:v>0.80020392553912989</c:v>
+                </c:pt>
+                <c:pt idx="49">
+                  <c:v>0.96932705553609078</c:v>
+                </c:pt>
+                <c:pt idx="50">
+                  <c:v>0.99888504692904245</c:v>
+                </c:pt>
+                <c:pt idx="51">
+                  <c:v>0.9693862328460412</c:v>
+                </c:pt>
+                <c:pt idx="52">
+                  <c:v>0.96399815944987077</c:v>
+                </c:pt>
+                <c:pt idx="53">
+                  <c:v>0.95388714896007942</c:v>
+                </c:pt>
+                <c:pt idx="54">
+                  <c:v>0.9961415336148931</c:v>
+                </c:pt>
+                <c:pt idx="55">
+                  <c:v>0.89511692656887809</c:v>
+                </c:pt>
+                <c:pt idx="56">
+                  <c:v>0.87399438819510789</c:v>
+                </c:pt>
+                <c:pt idx="57">
+                  <c:v>0.98841745581495233</c:v>
+                </c:pt>
+                <c:pt idx="58">
+                  <c:v>0.81044844572916608</c:v>
+                </c:pt>
+              </c:numCache>
+            </c:numRef>
+          </c:xVal>
+          <c:yVal>
+            <c:numRef>
+              <c:f>Sheet1!$B$2:$B$60</c:f>
+              <c:numCache>
+                <c:formatCode>General</c:formatCode>
+                <c:ptCount val="59"/>
+                <c:pt idx="0">
+                  <c:v>0.01</c:v>
+                </c:pt>
+                <c:pt idx="1">
+                  <c:v>0.08</c:v>
+                </c:pt>
+                <c:pt idx="2">
+                  <c:v>0.6</c:v>
+                </c:pt>
+                <c:pt idx="3">
+                  <c:v>1</c:v>
+                </c:pt>
+              </c:numCache>
+            </c:numRef>
+          </c:yVal>
+          <c:smooth val="0"/>
+        </c:ser>
+        <c:ser>
+          <c:idx val="1"/>
+          <c:order val="1"/>
+          <c:tx>
+            <c:strRef>
+              <c:f>Sheet1!$C$1</c:f>
+              <c:strCache>
+                <c:ptCount val="1"/>
+                <c:pt idx="0">
+                  <c:v>Non-optimal configurations</c:v>
+                </c:pt>
+              </c:strCache>
+            </c:strRef>
+          </c:tx>
+          <c:spPr>
+            <a:ln w="25400" cap="rnd">
+              <a:noFill/>
+              <a:round/>
+            </a:ln>
+            <a:effectLst/>
+          </c:spPr>
+          <c:marker>
+            <c:symbol val="circle"/>
+            <c:size val="5"/>
+            <c:spPr>
+              <a:solidFill>
+                <a:schemeClr val="accent1">
+                  <a:tint val="77000"/>
+                </a:schemeClr>
+              </a:solidFill>
+              <a:ln w="9525">
+                <a:solidFill>
+                  <a:schemeClr val="accent1">
+                    <a:tint val="77000"/>
+                  </a:schemeClr>
+                </a:solidFill>
+              </a:ln>
+              <a:effectLst/>
+            </c:spPr>
+          </c:marker>
+          <c:xVal>
+            <c:numRef>
+              <c:f>Sheet1!$A$2:$A$60</c:f>
+              <c:numCache>
+                <c:formatCode>General</c:formatCode>
+                <c:ptCount val="59"/>
+                <c:pt idx="0">
+                  <c:v>0</c:v>
+                </c:pt>
+                <c:pt idx="1">
+                  <c:v>0.2</c:v>
+                </c:pt>
+                <c:pt idx="2">
+                  <c:v>0.8</c:v>
+                </c:pt>
+                <c:pt idx="3">
+                  <c:v>1</c:v>
+                </c:pt>
+                <c:pt idx="4">
+                  <c:v>0.5</c:v>
+                </c:pt>
+                <c:pt idx="5">
+                  <c:v>0.6772113320915033</c:v>
+                </c:pt>
+                <c:pt idx="6">
+                  <c:v>0.67290902054268398</c:v>
+                </c:pt>
+                <c:pt idx="7">
+                  <c:v>0.2859596385123368</c:v>
+                </c:pt>
+                <c:pt idx="8">
+                  <c:v>0.71088394501022933</c:v>
+                </c:pt>
+                <c:pt idx="9">
+                  <c:v>0.67485932581006081</c:v>
+                </c:pt>
+                <c:pt idx="10">
+                  <c:v>0.40451374861621636</c:v>
+                </c:pt>
+                <c:pt idx="11">
+                  <c:v>0.38624610198779152</c:v>
+                </c:pt>
+                <c:pt idx="12">
+                  <c:v>0.43933044757381845</c:v>
+                </c:pt>
+                <c:pt idx="13">
+                  <c:v>0.4707373870292248</c:v>
+                </c:pt>
+                <c:pt idx="14">
+                  <c:v>0.43007746174589245</c:v>
+                </c:pt>
+                <c:pt idx="15">
+                  <c:v>0.45789169332304247</c:v>
+                </c:pt>
+                <c:pt idx="16">
+                  <c:v>0.72735290833425204</c:v>
+                </c:pt>
+                <c:pt idx="17">
+                  <c:v>0.51502009878188115</c:v>
+                </c:pt>
+                <c:pt idx="18">
+                  <c:v>0.71406912266140088</c:v>
+                </c:pt>
+                <c:pt idx="19">
+                  <c:v>0.41024702712527461</c:v>
+                </c:pt>
+                <c:pt idx="20">
+                  <c:v>0.23945471531027351</c:v>
+                </c:pt>
+                <c:pt idx="21">
+                  <c:v>0.7553088896456619</c:v>
+                </c:pt>
+                <c:pt idx="22">
+                  <c:v>0.44802675800176417</c:v>
+                </c:pt>
+                <c:pt idx="23">
+                  <c:v>0.74695135306483018</c:v>
+                </c:pt>
+                <c:pt idx="24">
+                  <c:v>0.32116122687684595</c:v>
+                </c:pt>
+                <c:pt idx="25">
+                  <c:v>0.79242287091948826</c:v>
+                </c:pt>
+                <c:pt idx="26">
+                  <c:v>0.24345526554224292</c:v>
+                </c:pt>
+                <c:pt idx="27">
+                  <c:v>0.30612427652449015</c:v>
+                </c:pt>
+                <c:pt idx="28">
+                  <c:v>0.55861960181599568</c:v>
+                </c:pt>
+                <c:pt idx="29">
+                  <c:v>0.30145208816403651</c:v>
+                </c:pt>
+                <c:pt idx="30">
+                  <c:v>0.37360927891333157</c:v>
+                </c:pt>
+                <c:pt idx="31">
+                  <c:v>0.65366042039419803</c:v>
+                </c:pt>
+                <c:pt idx="32">
+                  <c:v>0.38116932607607146</c:v>
+                </c:pt>
+                <c:pt idx="33">
+                  <c:v>0.57744048836671968</c:v>
+                </c:pt>
+                <c:pt idx="34">
+                  <c:v>0.11858538466911957</c:v>
+                </c:pt>
+                <c:pt idx="35">
+                  <c:v>5.9183753484281447E-2</c:v>
+                </c:pt>
+                <c:pt idx="36">
+                  <c:v>9.8108214064926383E-2</c:v>
+                </c:pt>
+                <c:pt idx="37">
+                  <c:v>0.15095121044816839</c:v>
+                </c:pt>
+                <c:pt idx="38">
+                  <c:v>0.12457402863403044</c:v>
+                </c:pt>
+                <c:pt idx="39">
+                  <c:v>4.7177229147734147E-3</c:v>
+                </c:pt>
+                <c:pt idx="40">
+                  <c:v>4.1616882744593325E-2</c:v>
+                </c:pt>
+                <c:pt idx="41">
+                  <c:v>7.0956681571415327E-3</c:v>
+                </c:pt>
+                <c:pt idx="42">
+                  <c:v>0.1506608002961381</c:v>
+                </c:pt>
+                <c:pt idx="43">
+                  <c:v>0.12003307872131708</c:v>
+                </c:pt>
+                <c:pt idx="44">
+                  <c:v>0.19700031735751505</c:v>
+                </c:pt>
+                <c:pt idx="45">
+                  <c:v>0.19150009716221419</c:v>
+                </c:pt>
+                <c:pt idx="46">
+                  <c:v>0.95926133630677146</c:v>
+                </c:pt>
+                <c:pt idx="47">
+                  <c:v>0.96502856640484436</c:v>
+                </c:pt>
+                <c:pt idx="48">
+                  <c:v>0.80020392553912989</c:v>
+                </c:pt>
+                <c:pt idx="49">
+                  <c:v>0.96932705553609078</c:v>
+                </c:pt>
+                <c:pt idx="50">
+                  <c:v>0.99888504692904245</c:v>
+                </c:pt>
+                <c:pt idx="51">
+                  <c:v>0.9693862328460412</c:v>
+                </c:pt>
+                <c:pt idx="52">
+                  <c:v>0.96399815944987077</c:v>
+                </c:pt>
+                <c:pt idx="53">
+                  <c:v>0.95388714896007942</c:v>
+                </c:pt>
+                <c:pt idx="54">
+                  <c:v>0.9961415336148931</c:v>
+                </c:pt>
+                <c:pt idx="55">
+                  <c:v>0.89511692656887809</c:v>
+                </c:pt>
+                <c:pt idx="56">
+                  <c:v>0.87399438819510789</c:v>
+                </c:pt>
+                <c:pt idx="57">
+                  <c:v>0.98841745581495233</c:v>
+                </c:pt>
+                <c:pt idx="58">
+                  <c:v>0.81044844572916608</c:v>
+                </c:pt>
+              </c:numCache>
+            </c:numRef>
+          </c:xVal>
+          <c:yVal>
+            <c:numRef>
+              <c:f>Sheet1!$C$2:$C$60</c:f>
+              <c:numCache>
+                <c:formatCode>General</c:formatCode>
+                <c:ptCount val="59"/>
+                <c:pt idx="1">
+                  <c:v>0.3</c:v>
+                </c:pt>
+                <c:pt idx="2">
+                  <c:v>0.7</c:v>
+                </c:pt>
+                <c:pt idx="4">
+                  <c:v>0.6</c:v>
+                </c:pt>
+                <c:pt idx="5">
+                  <c:v>0.91912465833502366</c:v>
+                </c:pt>
+                <c:pt idx="6">
+                  <c:v>0.90037124151318715</c:v>
+                </c:pt>
+                <c:pt idx="7">
+                  <c:v>0.58181667162341921</c:v>
+                </c:pt>
+                <c:pt idx="8">
+                  <c:v>0.85550042092266221</c:v>
+                </c:pt>
+                <c:pt idx="9">
+                  <c:v>0.67814551174903914</c:v>
+                </c:pt>
+                <c:pt idx="10">
+                  <c:v>0.62405760003619271</c:v>
+                </c:pt>
+                <c:pt idx="11">
+                  <c:v>0.51356853840391792</c:v>
+                </c:pt>
+                <c:pt idx="12">
+                  <c:v>0.76213476728435214</c:v>
+                </c:pt>
+                <c:pt idx="13">
+                  <c:v>0.74742805315205019</c:v>
+                </c:pt>
+                <c:pt idx="14">
+                  <c:v>0.55155515315958437</c:v>
+                </c:pt>
+                <c:pt idx="15">
+                  <c:v>0.50668026911186947</c:v>
+                </c:pt>
+                <c:pt idx="16">
+                  <c:v>1.0627360283935079</c:v>
+                </c:pt>
+                <c:pt idx="17">
+                  <c:v>0.76012473032096495</c:v>
+                </c:pt>
+                <c:pt idx="18">
+                  <c:v>1.0227253274798411</c:v>
+                </c:pt>
+                <c:pt idx="19">
+                  <c:v>0.78848298189368338</c:v>
+                </c:pt>
+                <c:pt idx="20">
+                  <c:v>0.44169234590807188</c:v>
+                </c:pt>
+                <c:pt idx="21">
+                  <c:v>1.1763754400226913</c:v>
+                </c:pt>
+                <c:pt idx="22">
+                  <c:v>0.88391056314231398</c:v>
+                </c:pt>
+                <c:pt idx="23">
+                  <c:v>0.83019337489598932</c:v>
+                </c:pt>
+                <c:pt idx="24">
+                  <c:v>0.54126413776806404</c:v>
+                </c:pt>
+                <c:pt idx="25">
+                  <c:v>1.2844378044434033</c:v>
+                </c:pt>
+                <c:pt idx="26">
+                  <c:v>0.34624298094547679</c:v>
+                </c:pt>
+                <c:pt idx="27">
+                  <c:v>0.33662829375706982</c:v>
+                </c:pt>
+                <c:pt idx="28">
+                  <c:v>0.81512090571106843</c:v>
+                </c:pt>
+                <c:pt idx="29">
+                  <c:v>0.3713409868343836</c:v>
+                </c:pt>
+                <c:pt idx="30">
+                  <c:v>0.38222017230138083</c:v>
+                </c:pt>
+                <c:pt idx="31">
+                  <c:v>0.91357563352450333</c:v>
+                </c:pt>
+                <c:pt idx="32">
+                  <c:v>0.5085581988407557</c:v>
+                </c:pt>
+                <c:pt idx="33">
+                  <c:v>1.0302953392356249</c:v>
+                </c:pt>
+                <c:pt idx="34">
+                  <c:v>0.29027776289083074</c:v>
+                </c:pt>
+                <c:pt idx="35">
+                  <c:v>0.36335287833274377</c:v>
+                </c:pt>
+                <c:pt idx="36">
+                  <c:v>0.43677954093520027</c:v>
+                </c:pt>
+                <c:pt idx="37">
+                  <c:v>0.44866026654033242</c:v>
+                </c:pt>
+                <c:pt idx="38">
+                  <c:v>0.57204996567129496</c:v>
+                </c:pt>
+                <c:pt idx="39">
+                  <c:v>0.2803983601885871</c:v>
+                </c:pt>
+                <c:pt idx="40">
+                  <c:v>0.46315524728722257</c:v>
+                </c:pt>
+                <c:pt idx="41">
+                  <c:v>2.932681908282515E-2</c:v>
+                </c:pt>
+                <c:pt idx="42">
+                  <c:v>0.25150714811636909</c:v>
+                </c:pt>
+                <c:pt idx="43">
+                  <c:v>0.38486075992638008</c:v>
+                </c:pt>
+                <c:pt idx="44">
+                  <c:v>0.33337991664103389</c:v>
+                </c:pt>
+                <c:pt idx="45">
+                  <c:v>0.49251272669272539</c:v>
+                </c:pt>
+                <c:pt idx="46">
+                  <c:v>1.1631063329745617</c:v>
+                </c:pt>
+                <c:pt idx="47">
+                  <c:v>1.3144037683750898</c:v>
+                </c:pt>
+                <c:pt idx="48">
+                  <c:v>0.81166167811439494</c:v>
+                </c:pt>
+                <c:pt idx="49">
+                  <c:v>1.0101998794757794</c:v>
+                </c:pt>
+                <c:pt idx="50">
+                  <c:v>1.2402656830371481</c:v>
+                </c:pt>
+                <c:pt idx="51">
+                  <c:v>0.98190973260138181</c:v>
+                </c:pt>
+                <c:pt idx="52">
+                  <c:v>1.1756516647713717</c:v>
+                </c:pt>
+                <c:pt idx="53">
+                  <c:v>1.0545489223131035</c:v>
+                </c:pt>
+                <c:pt idx="54">
+                  <c:v>1.0506519662366924</c:v>
+                </c:pt>
+                <c:pt idx="55">
+                  <c:v>0.9033395187317893</c:v>
+                </c:pt>
+                <c:pt idx="56">
+                  <c:v>0.94305087106305663</c:v>
+                </c:pt>
+                <c:pt idx="57">
+                  <c:v>1.2841818605909245</c:v>
+                </c:pt>
+                <c:pt idx="58">
+                  <c:v>1.17185491576717</c:v>
+                </c:pt>
+              </c:numCache>
+            </c:numRef>
+          </c:yVal>
+          <c:smooth val="0"/>
+        </c:ser>
+        <c:dLbls>
+          <c:showLegendKey val="0"/>
+          <c:showVal val="0"/>
+          <c:showCatName val="0"/>
+          <c:showSerName val="0"/>
+          <c:showPercent val="0"/>
+          <c:showBubbleSize val="0"/>
+        </c:dLbls>
+        <c:axId val="551933408"/>
+        <c:axId val="551942112"/>
+      </c:scatterChart>
+      <c:valAx>
+        <c:axId val="551933408"/>
+        <c:scaling>
+          <c:orientation val="minMax"/>
+          <c:max val="1"/>
+        </c:scaling>
+        <c:delete val="0"/>
+        <c:axPos val="b"/>
+        <c:title>
+          <c:tx>
+            <c:rich>
+              <a:bodyPr rot="0" spcFirstLastPara="1" vertOverflow="ellipsis" vert="horz" wrap="square" anchor="ctr" anchorCtr="1"/>
+              <a:lstStyle/>
+              <a:p>
+                <a:pPr>
+                  <a:defRPr sz="1800" b="0" i="0" u="none" strike="noStrike" kern="1200" baseline="0">
+                    <a:solidFill>
+                      <a:schemeClr val="tx1">
+                        <a:lumMod val="65000"/>
+                        <a:lumOff val="35000"/>
+                      </a:schemeClr>
+                    </a:solidFill>
+                    <a:latin typeface="+mn-lt"/>
+                    <a:ea typeface="+mn-ea"/>
+                    <a:cs typeface="+mn-cs"/>
+                  </a:defRPr>
+                </a:pPr>
+                <a:r>
+                  <a:rPr lang="en-US"/>
+                  <a:t>Normalized Speedup</a:t>
+                </a:r>
+              </a:p>
+            </c:rich>
+          </c:tx>
+          <c:layout/>
+          <c:overlay val="0"/>
+          <c:spPr>
+            <a:noFill/>
+            <a:ln>
+              <a:noFill/>
+            </a:ln>
+            <a:effectLst/>
+          </c:spPr>
+          <c:txPr>
+            <a:bodyPr rot="0" spcFirstLastPara="1" vertOverflow="ellipsis" vert="horz" wrap="square" anchor="ctr" anchorCtr="1"/>
+            <a:lstStyle/>
+            <a:p>
+              <a:pPr>
+                <a:defRPr sz="1800" b="0" i="0" u="none" strike="noStrike" kern="1200" baseline="0">
+                  <a:solidFill>
+                    <a:schemeClr val="tx1">
+                      <a:lumMod val="65000"/>
+                      <a:lumOff val="35000"/>
+                    </a:schemeClr>
+                  </a:solidFill>
+                  <a:latin typeface="+mn-lt"/>
+                  <a:ea typeface="+mn-ea"/>
+                  <a:cs typeface="+mn-cs"/>
+                </a:defRPr>
+              </a:pPr>
+              <a:endParaRPr lang="en-US"/>
+            </a:p>
+          </c:txPr>
+        </c:title>
+        <c:numFmt formatCode="General" sourceLinked="1"/>
+        <c:majorTickMark val="none"/>
+        <c:minorTickMark val="none"/>
+        <c:tickLblPos val="nextTo"/>
+        <c:spPr>
+          <a:noFill/>
+          <a:ln w="9525" cap="flat" cmpd="sng" algn="ctr">
+            <a:solidFill>
+              <a:schemeClr val="tx1">
+                <a:lumMod val="25000"/>
+                <a:lumOff val="75000"/>
+              </a:schemeClr>
+            </a:solidFill>
+            <a:round/>
+          </a:ln>
+          <a:effectLst/>
+        </c:spPr>
+        <c:txPr>
+          <a:bodyPr rot="-60000000" spcFirstLastPara="1" vertOverflow="ellipsis" vert="horz" wrap="square" anchor="ctr" anchorCtr="1"/>
+          <a:lstStyle/>
+          <a:p>
+            <a:pPr>
+              <a:defRPr sz="1600" b="0" i="0" u="none" strike="noStrike" kern="1200" baseline="0">
+                <a:solidFill>
+                  <a:schemeClr val="tx1">
+                    <a:lumMod val="65000"/>
+                    <a:lumOff val="35000"/>
+                  </a:schemeClr>
+                </a:solidFill>
+                <a:latin typeface="+mn-lt"/>
+                <a:ea typeface="+mn-ea"/>
+                <a:cs typeface="+mn-cs"/>
+              </a:defRPr>
+            </a:pPr>
+            <a:endParaRPr lang="en-US"/>
+          </a:p>
+        </c:txPr>
+        <c:crossAx val="551942112"/>
+        <c:crosses val="autoZero"/>
+        <c:crossBetween val="midCat"/>
+      </c:valAx>
+      <c:valAx>
+        <c:axId val="551942112"/>
+        <c:scaling>
+          <c:orientation val="minMax"/>
+          <c:max val="1"/>
+        </c:scaling>
+        <c:delete val="0"/>
+        <c:axPos val="l"/>
+        <c:majorGridlines>
+          <c:spPr>
+            <a:ln w="9525" cap="flat" cmpd="sng" algn="ctr">
+              <a:solidFill>
+                <a:schemeClr val="tx1">
+                  <a:lumMod val="15000"/>
+                  <a:lumOff val="85000"/>
+                </a:schemeClr>
+              </a:solidFill>
+              <a:round/>
+            </a:ln>
+            <a:effectLst/>
+          </c:spPr>
+        </c:majorGridlines>
+        <c:title>
+          <c:tx>
+            <c:rich>
+              <a:bodyPr rot="-5400000" spcFirstLastPara="1" vertOverflow="ellipsis" vert="horz" wrap="square" anchor="ctr" anchorCtr="1"/>
+              <a:lstStyle/>
+              <a:p>
+                <a:pPr>
+                  <a:defRPr sz="1800" b="0" i="0" u="none" strike="noStrike" kern="1200" baseline="0">
+                    <a:solidFill>
+                      <a:schemeClr val="tx1">
+                        <a:lumMod val="65000"/>
+                        <a:lumOff val="35000"/>
+                      </a:schemeClr>
+                    </a:solidFill>
+                    <a:latin typeface="+mn-lt"/>
+                    <a:ea typeface="+mn-ea"/>
+                    <a:cs typeface="+mn-cs"/>
+                  </a:defRPr>
+                </a:pPr>
+                <a:r>
+                  <a:rPr lang="en-US"/>
+                  <a:t>Normalized Power</a:t>
+                </a:r>
+              </a:p>
+            </c:rich>
+          </c:tx>
+          <c:layout/>
+          <c:overlay val="0"/>
+          <c:spPr>
+            <a:noFill/>
+            <a:ln>
+              <a:noFill/>
+            </a:ln>
+            <a:effectLst/>
+          </c:spPr>
+          <c:txPr>
+            <a:bodyPr rot="-5400000" spcFirstLastPara="1" vertOverflow="ellipsis" vert="horz" wrap="square" anchor="ctr" anchorCtr="1"/>
+            <a:lstStyle/>
+            <a:p>
+              <a:pPr>
+                <a:defRPr sz="1800" b="0" i="0" u="none" strike="noStrike" kern="1200" baseline="0">
+                  <a:solidFill>
+                    <a:schemeClr val="tx1">
+                      <a:lumMod val="65000"/>
+                      <a:lumOff val="35000"/>
+                    </a:schemeClr>
+                  </a:solidFill>
+                  <a:latin typeface="+mn-lt"/>
+                  <a:ea typeface="+mn-ea"/>
+                  <a:cs typeface="+mn-cs"/>
+                </a:defRPr>
+              </a:pPr>
+              <a:endParaRPr lang="en-US"/>
+            </a:p>
+          </c:txPr>
+        </c:title>
+        <c:numFmt formatCode="General" sourceLinked="1"/>
+        <c:majorTickMark val="none"/>
+        <c:minorTickMark val="none"/>
+        <c:tickLblPos val="nextTo"/>
+        <c:spPr>
+          <a:noFill/>
+          <a:ln w="9525" cap="flat" cmpd="sng" algn="ctr">
+            <a:solidFill>
+              <a:schemeClr val="tx1">
+                <a:lumMod val="25000"/>
+                <a:lumOff val="75000"/>
+              </a:schemeClr>
+            </a:solidFill>
+            <a:round/>
+          </a:ln>
+          <a:effectLst/>
+        </c:spPr>
+        <c:txPr>
+          <a:bodyPr rot="-60000000" spcFirstLastPara="1" vertOverflow="ellipsis" vert="horz" wrap="square" anchor="ctr" anchorCtr="1"/>
+          <a:lstStyle/>
+          <a:p>
+            <a:pPr>
+              <a:defRPr sz="1600" b="0" i="0" u="none" strike="noStrike" kern="1200" baseline="0">
+                <a:solidFill>
+                  <a:schemeClr val="tx1">
+                    <a:lumMod val="65000"/>
+                    <a:lumOff val="35000"/>
+                  </a:schemeClr>
+                </a:solidFill>
+                <a:latin typeface="+mn-lt"/>
+                <a:ea typeface="+mn-ea"/>
+                <a:cs typeface="+mn-cs"/>
+              </a:defRPr>
+            </a:pPr>
+            <a:endParaRPr lang="en-US"/>
+          </a:p>
+        </c:txPr>
+        <c:crossAx val="551933408"/>
+        <c:crosses val="autoZero"/>
+        <c:crossBetween val="midCat"/>
+        <c:majorUnit val="0.2"/>
+      </c:valAx>
+      <c:spPr>
+        <a:noFill/>
+        <a:ln>
+          <a:noFill/>
+        </a:ln>
+        <a:effectLst/>
+      </c:spPr>
+    </c:plotArea>
+    <c:legend>
+      <c:legendPos val="t"/>
+      <c:layout/>
+      <c:overlay val="0"/>
+      <c:spPr>
+        <a:noFill/>
+        <a:ln>
+          <a:noFill/>
+        </a:ln>
+        <a:effectLst/>
+      </c:spPr>
+      <c:txPr>
+        <a:bodyPr rot="0" spcFirstLastPara="1" vertOverflow="ellipsis" vert="horz" wrap="square" anchor="ctr" anchorCtr="1"/>
+        <a:lstStyle/>
+        <a:p>
+          <a:pPr>
+            <a:defRPr sz="1800" b="0" i="0" u="none" strike="noStrike" kern="1200" baseline="0">
+              <a:solidFill>
+                <a:schemeClr val="tx1">
+                  <a:lumMod val="65000"/>
+                  <a:lumOff val="35000"/>
+                </a:schemeClr>
+              </a:solidFill>
+              <a:latin typeface="+mn-lt"/>
+              <a:ea typeface="+mn-ea"/>
+              <a:cs typeface="+mn-cs"/>
+            </a:defRPr>
+          </a:pPr>
+          <a:endParaRPr lang="en-US"/>
+        </a:p>
+      </c:txPr>
+    </c:legend>
+    <c:plotVisOnly val="1"/>
+    <c:dispBlanksAs val="gap"/>
+    <c:showDLblsOverMax val="0"/>
+  </c:chart>
+  <c:spPr>
+    <a:noFill/>
+    <a:ln>
+      <a:noFill/>
+    </a:ln>
+    <a:effectLst/>
+  </c:spPr>
+  <c:txPr>
+    <a:bodyPr/>
+    <a:lstStyle/>
+    <a:p>
+      <a:pPr>
+        <a:defRPr sz="1800"/>
+      </a:pPr>
+      <a:endParaRPr lang="en-US"/>
+    </a:p>
+  </c:txPr>
+  <c:externalData r:id="rId3">
+    <c:autoUpdate val="0"/>
+  </c:externalData>
+</c:chartSpace>
+</file>
+
+<file path=ppt/charts/colors1.xml><?xml version="1.0" encoding="utf-8"?>
+<cs:colorStyle xmlns:cs="http://schemas.microsoft.com/office/drawing/2012/chartStyle" xmlns:a="http://schemas.openxmlformats.org/drawingml/2006/main" meth="withinLinear" id="14">
+  <a:schemeClr val="accent1"/>
+</cs:colorStyle>
+</file>
+
+<file path=ppt/charts/style1.xml><?xml version="1.0" encoding="utf-8"?>
+<cs:chartStyle xmlns:cs="http://schemas.microsoft.com/office/drawing/2012/chartStyle" xmlns:a="http://schemas.openxmlformats.org/drawingml/2006/main" id="240">
+  <cs:axisTitle>
+    <cs:lnRef idx="0"/>
+    <cs:fillRef idx="0"/>
+    <cs:effectRef idx="0"/>
+    <cs:fontRef idx="minor">
+      <a:schemeClr val="tx1">
+        <a:lumMod val="65000"/>
+        <a:lumOff val="35000"/>
+      </a:schemeClr>
+    </cs:fontRef>
+    <cs:defRPr sz="1330" kern="1200"/>
+  </cs:axisTitle>
+  <cs:categoryAxis>
+    <cs:lnRef idx="0"/>
+    <cs:fillRef idx="0"/>
+    <cs:effectRef idx="0"/>
+    <cs:fontRef idx="minor">
+      <a:schemeClr val="tx1">
+        <a:lumMod val="65000"/>
+        <a:lumOff val="35000"/>
+      </a:schemeClr>
+    </cs:fontRef>
+    <cs:spPr>
+      <a:ln w="9525" cap="flat" cmpd="sng" algn="ctr">
+        <a:solidFill>
+          <a:schemeClr val="tx1">
+            <a:lumMod val="25000"/>
+            <a:lumOff val="75000"/>
+          </a:schemeClr>
+        </a:solidFill>
+        <a:round/>
+      </a:ln>
+    </cs:spPr>
+    <cs:defRPr sz="1197" kern="1200"/>
+  </cs:categoryAxis>
+  <cs:chartArea mods="allowNoFillOverride allowNoLineOverride">
+    <cs:lnRef idx="0"/>
+    <cs:fillRef idx="0"/>
+    <cs:effectRef idx="0"/>
+    <cs:fontRef idx="minor">
+      <a:schemeClr val="tx1"/>
+    </cs:fontRef>
+    <cs:spPr>
+      <a:solidFill>
+        <a:schemeClr val="bg1"/>
+      </a:solidFill>
+      <a:ln w="9525" cap="flat" cmpd="sng" algn="ctr">
+        <a:solidFill>
+          <a:schemeClr val="tx1">
+            <a:lumMod val="15000"/>
+            <a:lumOff val="85000"/>
+          </a:schemeClr>
+        </a:solidFill>
+        <a:round/>
+      </a:ln>
+    </cs:spPr>
+    <cs:defRPr sz="1330" kern="1200"/>
+  </cs:chartArea>
+  <cs:dataLabel>
+    <cs:lnRef idx="0"/>
+    <cs:fillRef idx="0"/>
+    <cs:effectRef idx="0"/>
+    <cs:fontRef idx="minor">
+      <a:schemeClr val="tx1">
+        <a:lumMod val="75000"/>
+        <a:lumOff val="25000"/>
+      </a:schemeClr>
+    </cs:fontRef>
+    <cs:defRPr sz="1197" kern="1200"/>
+  </cs:dataLabel>
+  <cs:dataLabelCallout>
+    <cs:lnRef idx="0"/>
+    <cs:fillRef idx="0"/>
+    <cs:effectRef idx="0"/>
+    <cs:fontRef idx="minor">
+      <a:schemeClr val="dk1">
+        <a:lumMod val="65000"/>
+        <a:lumOff val="35000"/>
+      </a:schemeClr>
+    </cs:fontRef>
+    <cs:spPr>
+      <a:solidFill>
+        <a:schemeClr val="lt1"/>
+      </a:solidFill>
+      <a:ln>
+        <a:solidFill>
+          <a:schemeClr val="dk1">
+            <a:lumMod val="25000"/>
+            <a:lumOff val="75000"/>
+          </a:schemeClr>
+        </a:solidFill>
+      </a:ln>
+    </cs:spPr>
+    <cs:defRPr sz="1197" kern="1200"/>
+    <cs:bodyPr rot="0" spcFirstLastPara="1" vertOverflow="clip" horzOverflow="clip" vert="horz" wrap="square" lIns="36576" tIns="18288" rIns="36576" bIns="18288" anchor="ctr" anchorCtr="1">
+      <a:spAutoFit/>
+    </cs:bodyPr>
+  </cs:dataLabelCallout>
+  <cs:dataPoint>
+    <cs:lnRef idx="0"/>
+    <cs:fillRef idx="1">
+      <cs:styleClr val="auto"/>
+    </cs:fillRef>
+    <cs:effectRef idx="0"/>
+    <cs:fontRef idx="minor">
+      <a:schemeClr val="tx1"/>
+    </cs:fontRef>
+  </cs:dataPoint>
+  <cs:dataPoint3D>
+    <cs:lnRef idx="0"/>
+    <cs:fillRef idx="1">
+      <cs:styleClr val="auto"/>
+    </cs:fillRef>
+    <cs:effectRef idx="0"/>
+    <cs:fontRef idx="minor">
+      <a:schemeClr val="tx1"/>
+    </cs:fontRef>
+  </cs:dataPoint3D>
+  <cs:dataPointLine>
+    <cs:lnRef idx="0">
+      <cs:styleClr val="auto"/>
+    </cs:lnRef>
+    <cs:fillRef idx="1"/>
+    <cs:effectRef idx="0"/>
+    <cs:fontRef idx="minor">
+      <a:schemeClr val="tx1"/>
+    </cs:fontRef>
+    <cs:spPr>
+      <a:ln w="19050" cap="rnd">
+        <a:solidFill>
+          <a:schemeClr val="phClr"/>
+        </a:solidFill>
+        <a:round/>
+      </a:ln>
+    </cs:spPr>
+  </cs:dataPointLine>
+  <cs:dataPointMarker>
+    <cs:lnRef idx="0">
+      <cs:styleClr val="auto"/>
+    </cs:lnRef>
+    <cs:fillRef idx="1">
+      <cs:styleClr val="auto"/>
+    </cs:fillRef>
+    <cs:effectRef idx="0"/>
+    <cs:fontRef idx="minor">
+      <a:schemeClr val="tx1"/>
+    </cs:fontRef>
+    <cs:spPr>
+      <a:ln w="9525">
+        <a:solidFill>
+          <a:schemeClr val="phClr"/>
+        </a:solidFill>
+      </a:ln>
+    </cs:spPr>
+  </cs:dataPointMarker>
+  <cs:dataPointMarkerLayout symbol="circle" size="5"/>
+  <cs:dataPointWireframe>
+    <cs:lnRef idx="0">
+      <cs:styleClr val="auto"/>
+    </cs:lnRef>
+    <cs:fillRef idx="0"/>
+    <cs:effectRef idx="0"/>
+    <cs:fontRef idx="minor">
+      <a:schemeClr val="dk1"/>
+    </cs:fontRef>
+    <cs:spPr>
+      <a:ln w="9525" cap="rnd">
+        <a:solidFill>
+          <a:schemeClr val="phClr"/>
+        </a:solidFill>
+        <a:round/>
+      </a:ln>
+    </cs:spPr>
+  </cs:dataPointWireframe>
+  <cs:dataTable>
+    <cs:lnRef idx="0"/>
+    <cs:fillRef idx="0"/>
+    <cs:effectRef idx="0"/>
+    <cs:fontRef idx="minor">
+      <a:schemeClr val="tx1">
+        <a:lumMod val="65000"/>
+        <a:lumOff val="35000"/>
+      </a:schemeClr>
+    </cs:fontRef>
+    <cs:spPr>
+      <a:noFill/>
+      <a:ln w="9525" cap="flat" cmpd="sng" algn="ctr">
+        <a:solidFill>
+          <a:schemeClr val="tx1">
+            <a:lumMod val="15000"/>
+            <a:lumOff val="85000"/>
+          </a:schemeClr>
+        </a:solidFill>
+        <a:round/>
+      </a:ln>
+    </cs:spPr>
+    <cs:defRPr sz="1197" kern="1200"/>
+  </cs:dataTable>
+  <cs:downBar>
+    <cs:lnRef idx="0"/>
+    <cs:fillRef idx="0"/>
+    <cs:effectRef idx="0"/>
+    <cs:fontRef idx="minor">
+      <a:schemeClr val="tx1"/>
+    </cs:fontRef>
+    <cs:spPr>
+      <a:solidFill>
+        <a:schemeClr val="dk1">
+          <a:lumMod val="75000"/>
+          <a:lumOff val="25000"/>
+        </a:schemeClr>
+      </a:solidFill>
+      <a:ln w="9525" cap="flat" cmpd="sng" algn="ctr">
+        <a:solidFill>
+          <a:schemeClr val="tx1">
+            <a:lumMod val="65000"/>
+            <a:lumOff val="35000"/>
+          </a:schemeClr>
+        </a:solidFill>
+        <a:round/>
+      </a:ln>
+    </cs:spPr>
+  </cs:downBar>
+  <cs:dropLine>
+    <cs:lnRef idx="0"/>
+    <cs:fillRef idx="0"/>
+    <cs:effectRef idx="0"/>
+    <cs:fontRef idx="minor">
+      <a:schemeClr val="tx1"/>
+    </cs:fontRef>
+    <cs:spPr>
+      <a:ln w="9525" cap="flat" cmpd="sng" algn="ctr">
+        <a:solidFill>
+          <a:schemeClr val="tx1">
+            <a:lumMod val="35000"/>
+            <a:lumOff val="65000"/>
+          </a:schemeClr>
+        </a:solidFill>
+        <a:round/>
+      </a:ln>
+    </cs:spPr>
+  </cs:dropLine>
+  <cs:errorBar>
+    <cs:lnRef idx="0"/>
+    <cs:fillRef idx="0"/>
+    <cs:effectRef idx="0"/>
+    <cs:fontRef idx="minor">
+      <a:schemeClr val="tx1"/>
+    </cs:fontRef>
+    <cs:spPr>
+      <a:ln w="9525" cap="flat" cmpd="sng" algn="ctr">
+        <a:solidFill>
+          <a:schemeClr val="tx1">
+            <a:lumMod val="65000"/>
+            <a:lumOff val="35000"/>
+          </a:schemeClr>
+        </a:solidFill>
+        <a:round/>
+      </a:ln>
+    </cs:spPr>
+  </cs:errorBar>
+  <cs:floor>
+    <cs:lnRef idx="0"/>
+    <cs:fillRef idx="0"/>
+    <cs:effectRef idx="0"/>
+    <cs:fontRef idx="minor">
+      <a:schemeClr val="tx1"/>
+    </cs:fontRef>
+    <cs:spPr>
+      <a:noFill/>
+      <a:ln>
+        <a:noFill/>
+      </a:ln>
+    </cs:spPr>
+  </cs:floor>
+  <cs:gridlineMajor>
+    <cs:lnRef idx="0"/>
+    <cs:fillRef idx="0"/>
+    <cs:effectRef idx="0"/>
+    <cs:fontRef idx="minor">
+      <a:schemeClr val="tx1"/>
+    </cs:fontRef>
+    <cs:spPr>
+      <a:ln w="9525" cap="flat" cmpd="sng" algn="ctr">
+        <a:solidFill>
+          <a:schemeClr val="tx1">
+            <a:lumMod val="15000"/>
+            <a:lumOff val="85000"/>
+          </a:schemeClr>
+        </a:solidFill>
+        <a:round/>
+      </a:ln>
+    </cs:spPr>
+  </cs:gridlineMajor>
+  <cs:gridlineMinor>
+    <cs:lnRef idx="0"/>
+    <cs:fillRef idx="0"/>
+    <cs:effectRef idx="0"/>
+    <cs:fontRef idx="minor">
+      <a:schemeClr val="tx1"/>
+    </cs:fontRef>
+    <cs:spPr>
+      <a:ln w="9525" cap="flat" cmpd="sng" algn="ctr">
+        <a:solidFill>
+          <a:schemeClr val="tx1">
+            <a:lumMod val="5000"/>
+            <a:lumOff val="95000"/>
+          </a:schemeClr>
+        </a:solidFill>
+        <a:round/>
+      </a:ln>
+    </cs:spPr>
+  </cs:gridlineMinor>
+  <cs:hiLoLine>
+    <cs:lnRef idx="0"/>
+    <cs:fillRef idx="0"/>
+    <cs:effectRef idx="0"/>
+    <cs:fontRef idx="minor">
+      <a:schemeClr val="tx1"/>
+    </cs:fontRef>
+    <cs:spPr>
+      <a:ln w="9525" cap="flat" cmpd="sng" algn="ctr">
+        <a:solidFill>
+          <a:schemeClr val="tx1">
+            <a:lumMod val="50000"/>
+            <a:lumOff val="50000"/>
+          </a:schemeClr>
+        </a:solidFill>
+        <a:round/>
+      </a:ln>
+    </cs:spPr>
+  </cs:hiLoLine>
+  <cs:leaderLine>
+    <cs:lnRef idx="0"/>
+    <cs:fillRef idx="0"/>
+    <cs:effectRef idx="0"/>
+    <cs:fontRef idx="minor">
+      <a:schemeClr val="tx1"/>
+    </cs:fontRef>
+    <cs:spPr>
+      <a:ln w="9525" cap="flat" cmpd="sng" algn="ctr">
+        <a:solidFill>
+          <a:schemeClr val="tx1">
+            <a:lumMod val="35000"/>
+            <a:lumOff val="65000"/>
+          </a:schemeClr>
+        </a:solidFill>
+        <a:round/>
+      </a:ln>
+    </cs:spPr>
+  </cs:leaderLine>
+  <cs:legend>
+    <cs:lnRef idx="0"/>
+    <cs:fillRef idx="0"/>
+    <cs:effectRef idx="0"/>
+    <cs:fontRef idx="minor">
+      <a:schemeClr val="tx1">
+        <a:lumMod val="65000"/>
+        <a:lumOff val="35000"/>
+      </a:schemeClr>
+    </cs:fontRef>
+    <cs:defRPr sz="1197" kern="1200"/>
+  </cs:legend>
+  <cs:plotArea mods="allowNoFillOverride allowNoLineOverride">
+    <cs:lnRef idx="0"/>
+    <cs:fillRef idx="0"/>
+    <cs:effectRef idx="0"/>
+    <cs:fontRef idx="minor">
+      <a:schemeClr val="tx1"/>
+    </cs:fontRef>
+  </cs:plotArea>
+  <cs:plotArea3D mods="allowNoFillOverride allowNoLineOverride">
+    <cs:lnRef idx="0"/>
+    <cs:fillRef idx="0"/>
+    <cs:effectRef idx="0"/>
+    <cs:fontRef idx="minor">
+      <a:schemeClr val="tx1"/>
+    </cs:fontRef>
+  </cs:plotArea3D>
+  <cs:seriesAxis>
+    <cs:lnRef idx="0"/>
+    <cs:fillRef idx="0"/>
+    <cs:effectRef idx="0"/>
+    <cs:fontRef idx="minor">
+      <a:schemeClr val="tx1">
+        <a:lumMod val="65000"/>
+        <a:lumOff val="35000"/>
+      </a:schemeClr>
+    </cs:fontRef>
+    <cs:defRPr sz="1197" kern="1200"/>
+  </cs:seriesAxis>
+  <cs:seriesLine>
+    <cs:lnRef idx="0"/>
+    <cs:fillRef idx="0"/>
+    <cs:effectRef idx="0"/>
+    <cs:fontRef idx="minor">
+      <a:schemeClr val="tx1"/>
+    </cs:fontRef>
+    <cs:spPr>
+      <a:ln w="9525" cap="flat" cmpd="sng" algn="ctr">
+        <a:solidFill>
+          <a:schemeClr val="tx1">
+            <a:lumMod val="35000"/>
+            <a:lumOff val="65000"/>
+          </a:schemeClr>
+        </a:solidFill>
+        <a:round/>
+      </a:ln>
+    </cs:spPr>
+  </cs:seriesLine>
+  <cs:title>
+    <cs:lnRef idx="0"/>
+    <cs:fillRef idx="0"/>
+    <cs:effectRef idx="0"/>
+    <cs:fontRef idx="minor">
+      <a:schemeClr val="tx1">
+        <a:lumMod val="65000"/>
+        <a:lumOff val="35000"/>
+      </a:schemeClr>
+    </cs:fontRef>
+    <cs:defRPr sz="1862" b="0" kern="1200" spc="0" baseline="0"/>
+  </cs:title>
+  <cs:trendline>
+    <cs:lnRef idx="0">
+      <cs:styleClr val="auto"/>
+    </cs:lnRef>
+    <cs:fillRef idx="0"/>
+    <cs:effectRef idx="0"/>
+    <cs:fontRef idx="minor">
+      <a:schemeClr val="tx1"/>
+    </cs:fontRef>
+    <cs:spPr>
+      <a:ln w="19050" cap="rnd">
+        <a:solidFill>
+          <a:schemeClr val="phClr"/>
+        </a:solidFill>
+        <a:prstDash val="sysDot"/>
+      </a:ln>
+    </cs:spPr>
+  </cs:trendline>
+  <cs:trendlineLabel>
+    <cs:lnRef idx="0"/>
+    <cs:fillRef idx="0"/>
+    <cs:effectRef idx="0"/>
+    <cs:fontRef idx="minor">
+      <a:schemeClr val="tx1">
+        <a:lumMod val="65000"/>
+        <a:lumOff val="35000"/>
+      </a:schemeClr>
+    </cs:fontRef>
+    <cs:defRPr sz="1197" kern="1200"/>
+  </cs:trendlineLabel>
+  <cs:upBar>
+    <cs:lnRef idx="0"/>
+    <cs:fillRef idx="0"/>
+    <cs:effectRef idx="0"/>
+    <cs:fontRef idx="minor">
+      <a:schemeClr val="tx1"/>
+    </cs:fontRef>
+    <cs:spPr>
+      <a:solidFill>
+        <a:schemeClr val="lt1"/>
+      </a:solidFill>
+      <a:ln w="9525" cap="flat" cmpd="sng" algn="ctr">
+        <a:solidFill>
+          <a:schemeClr val="tx1">
+            <a:lumMod val="65000"/>
+            <a:lumOff val="35000"/>
+          </a:schemeClr>
+        </a:solidFill>
+        <a:round/>
+      </a:ln>
+    </cs:spPr>
+  </cs:upBar>
+  <cs:valueAxis>
+    <cs:lnRef idx="0"/>
+    <cs:fillRef idx="0"/>
+    <cs:effectRef idx="0"/>
+    <cs:fontRef idx="minor">
+      <a:schemeClr val="tx1">
+        <a:lumMod val="65000"/>
+        <a:lumOff val="35000"/>
+      </a:schemeClr>
+    </cs:fontRef>
+    <cs:spPr>
+      <a:ln w="9525" cap="flat" cmpd="sng" algn="ctr">
+        <a:solidFill>
+          <a:schemeClr val="tx1">
+            <a:lumMod val="25000"/>
+            <a:lumOff val="75000"/>
+          </a:schemeClr>
+        </a:solidFill>
+        <a:round/>
+      </a:ln>
+    </cs:spPr>
+    <cs:defRPr sz="1197" kern="1200"/>
+  </cs:valueAxis>
+  <cs:wall>
+    <cs:lnRef idx="0"/>
+    <cs:fillRef idx="0"/>
+    <cs:effectRef idx="0"/>
+    <cs:fontRef idx="minor">
+      <a:schemeClr val="tx1"/>
+    </cs:fontRef>
+    <cs:spPr>
+      <a:noFill/>
+      <a:ln>
+        <a:noFill/>
+      </a:ln>
+    </cs:spPr>
+  </cs:wall>
+</cs:chartStyle>
 </file>
 
 <file path=ppt/slideLayouts/slideLayout1.xml><?xml version="1.0" encoding="utf-8"?>
@@ -14047,6 +15554,58 @@
           <a:chExt cx="0" cy="0"/>
         </a:xfrm>
       </p:grpSpPr>
+      <p:graphicFrame>
+        <p:nvGraphicFramePr>
+          <p:cNvPr id="5" name="Chart 4"/>
+          <p:cNvGraphicFramePr/>
+          <p:nvPr>
+            <p:extLst>
+              <p:ext uri="{D42A27DB-BD31-4B8C-83A1-F6EECF244321}">
+                <p14:modId xmlns:p14="http://schemas.microsoft.com/office/powerpoint/2010/main" val="1727018095"/>
+              </p:ext>
+            </p:extLst>
+          </p:nvPr>
+        </p:nvGraphicFramePr>
+        <p:xfrm>
+          <a:off x="1524000" y="1359877"/>
+          <a:ext cx="6096000" cy="4101123"/>
+        </p:xfrm>
+        <a:graphic>
+          <a:graphicData uri="http://schemas.openxmlformats.org/drawingml/2006/chart">
+            <c:chart xmlns:c="http://schemas.openxmlformats.org/drawingml/2006/chart" xmlns:r="http://schemas.openxmlformats.org/officeDocument/2006/relationships" r:id="rId2"/>
+          </a:graphicData>
+        </a:graphic>
+      </p:graphicFrame>
+    </p:spTree>
+    <p:extLst>
+      <p:ext uri="{BB962C8B-B14F-4D97-AF65-F5344CB8AC3E}">
+        <p14:creationId xmlns:p14="http://schemas.microsoft.com/office/powerpoint/2010/main" val="3198706353"/>
+      </p:ext>
+    </p:extLst>
+  </p:cSld>
+  <p:clrMapOvr>
+    <a:masterClrMapping/>
+  </p:clrMapOvr>
+</p:sld>
+</file>
+
+<file path=ppt/slides/slide7.xml><?xml version="1.0" encoding="utf-8"?>
+<p:sld xmlns:a="http://schemas.openxmlformats.org/drawingml/2006/main" xmlns:r="http://schemas.openxmlformats.org/officeDocument/2006/relationships" xmlns:p="http://schemas.openxmlformats.org/presentationml/2006/main">
+  <p:cSld>
+    <p:spTree>
+      <p:nvGrpSpPr>
+        <p:cNvPr id="1" name=""/>
+        <p:cNvGrpSpPr/>
+        <p:nvPr/>
+      </p:nvGrpSpPr>
+      <p:grpSpPr>
+        <a:xfrm>
+          <a:off x="0" y="0"/>
+          <a:ext cx="0" cy="0"/>
+          <a:chOff x="0" y="0"/>
+          <a:chExt cx="0" cy="0"/>
+        </a:xfrm>
+      </p:grpSpPr>
       <p:sp>
         <p:nvSpPr>
           <p:cNvPr id="2" name="Rectangle 1"/>

</xml_diff>